<commit_message>
updated documentaiton state machine transmission
</commit_message>
<xml_diff>
--- a/documentation/State-Machine.pptx
+++ b/documentation/State-Machine.pptx
@@ -6,6 +6,7 @@
   </p:sldMasterIdLst>
   <p:sldIdLst>
     <p:sldId id="256" r:id="rId3"/>
+    <p:sldId id="257" r:id="rId4"/>
   </p:sldIdLst>
   <p:sldSz cx="12192000" cy="6858000"/>
   <p:notesSz cx="6858000" cy="12192000"/>
@@ -3794,7 +3795,7 @@
           <p:nvPr isPhoto="0" userDrawn="0"/>
         </p:nvCxnSpPr>
         <p:spPr bwMode="auto">
-          <a:xfrm rot="5399978" flipH="0" flipV="0">
+          <a:xfrm rot="5399977" flipH="0" flipV="0">
             <a:off x="2782394" y="5198816"/>
             <a:ext cx="401113" cy="0"/>
           </a:xfrm>
@@ -3931,7 +3932,7 @@
           <p:nvPr isPhoto="0" userDrawn="0"/>
         </p:nvCxnSpPr>
         <p:spPr bwMode="auto">
-          <a:xfrm rot="10799990" flipH="1" flipV="0">
+          <a:xfrm rot="10799989" flipH="1" flipV="0">
             <a:off x="1137953" y="1397255"/>
             <a:ext cx="767723" cy="4575467"/>
           </a:xfrm>
@@ -4246,7 +4247,7 @@
           <p:nvPr isPhoto="0" userDrawn="0"/>
         </p:nvCxnSpPr>
         <p:spPr bwMode="auto">
-          <a:xfrm rot="5399978" flipH="0" flipV="0">
+          <a:xfrm rot="5399977" flipH="0" flipV="0">
             <a:off x="9810549" y="5198816"/>
             <a:ext cx="401112" cy="0"/>
           </a:xfrm>
@@ -4474,7 +4475,7 @@
                 <a:ea typeface="CMU Serif"/>
                 <a:cs typeface="CMU Serif"/>
               </a:rPr>
-              <a:t>confirm</a:t>
+              <a:t>response</a:t>
             </a:r>
             <a:endParaRPr i="0">
               <a:solidFill>
@@ -4522,7 +4523,7 @@
           <p:nvPr isPhoto="0" userDrawn="0"/>
         </p:nvCxnSpPr>
         <p:spPr bwMode="auto">
-          <a:xfrm rot="10799990" flipH="0" flipV="0">
+          <a:xfrm rot="10799989" flipH="0" flipV="0">
             <a:off x="6926972" y="5972723"/>
             <a:ext cx="1997478" cy="0"/>
           </a:xfrm>
@@ -4566,7 +4567,7 @@
           <p:nvPr isPhoto="0" userDrawn="0"/>
         </p:nvCxnSpPr>
         <p:spPr bwMode="auto">
-          <a:xfrm rot="10799990" flipH="0" flipV="1">
+          <a:xfrm rot="10799989" flipH="0" flipV="1">
             <a:off x="4060224" y="5972723"/>
             <a:ext cx="702818" cy="0"/>
           </a:xfrm>
@@ -4864,9 +4865,9 @@
           <p:nvPr isPhoto="0" userDrawn="0"/>
         </p:nvCxnSpPr>
         <p:spPr bwMode="auto">
-          <a:xfrm rot="5399978" flipH="0" flipV="0">
+          <a:xfrm rot="5399977" flipH="0" flipV="0">
             <a:off x="9844810" y="2658582"/>
-            <a:ext cx="3019279" cy="513376"/>
+            <a:ext cx="3019279" cy="513375"/>
           </a:xfrm>
           <a:prstGeom prst="bentConnector2">
             <a:avLst/>
@@ -4938,6 +4939,2179 @@
           </a:fontRef>
         </p:style>
       </p:cxnSp>
+    </p:spTree>
+  </p:cSld>
+  <p:clrMapOvr>
+    <a:masterClrMapping/>
+  </p:clrMapOvr>
+  <mc:AlternateContent xmlns:mc="http://schemas.openxmlformats.org/markup-compatibility/2006">
+    <mc:Choice xmlns:p14="http://schemas.microsoft.com/office/powerpoint/2010/main" Requires="p14">
+      <p:transition p14:dur="2000" advClick="1"/>
+    </mc:Choice>
+    <mc:Fallback>
+      <p:transition advClick="1"/>
+    </mc:Fallback>
+  </mc:AlternateContent>
+</p:sld>
+</file>
+
+<file path=ppt/slides/slide2.xml><?xml version="1.0" encoding="utf-8"?>
+<p:sld xmlns:a="http://schemas.openxmlformats.org/drawingml/2006/main" xmlns:r="http://schemas.openxmlformats.org/officeDocument/2006/relationships" xmlns:p="http://schemas.openxmlformats.org/presentationml/2006/main" xmlns:m="http://schemas.openxmlformats.org/officeDocument/2006/math" xmlns:w="http://schemas.openxmlformats.org/wordprocessingml/2006/main" showMasterPhAnim="0" show="1">
+  <p:cSld name="">
+    <p:spTree>
+      <p:nvGrpSpPr>
+        <p:cNvPr id="1" name="" hidden="0"/>
+        <p:cNvGrpSpPr/>
+        <p:nvPr isPhoto="0" userDrawn="0"/>
+      </p:nvGrpSpPr>
+      <p:grpSpPr bwMode="auto">
+        <a:xfrm>
+          <a:off x="0" y="0"/>
+          <a:ext cx="0" cy="0"/>
+          <a:chOff x="0" y="0"/>
+          <a:chExt cx="0" cy="0"/>
+        </a:xfrm>
+      </p:grpSpPr>
+      <p:graphicFrame>
+        <p:nvGraphicFramePr>
+          <p:cNvPr id="4" name="" hidden="0"/>
+          <p:cNvGraphicFramePr>
+            <a:graphicFrameLocks xmlns:a="http://schemas.openxmlformats.org/drawingml/2006/main"/>
+          </p:cNvGraphicFramePr>
+          <p:nvPr isPhoto="0" userDrawn="0"/>
+        </p:nvGraphicFramePr>
+        <p:xfrm>
+          <a:off x="465666" y="565943"/>
+          <a:ext cx="2426276" cy="2283459"/>
+        </p:xfrm>
+        <a:graphic>
+          <a:graphicData uri="http://schemas.openxmlformats.org/drawingml/2006/table">
+            <a:tbl>
+              <a:tblPr firstRow="1" firstCol="0" lastRow="0" lastCol="0" bandRow="1" bandCol="0">
+                <a:tableStyleId>{B8CBBEDC-A73A-6342-AF84-C5CCFE4BA3C3}</a:tableStyleId>
+              </a:tblPr>
+              <a:tblGrid>
+                <a:gridCol w="2413576"/>
+              </a:tblGrid>
+              <a:tr h="311807">
+                <a:tc>
+                  <a:txBody>
+                    <a:bodyPr/>
+                    <a:p>
+                      <a:pPr algn="ctr">
+                        <a:defRPr/>
+                      </a:pPr>
+                      <a:r>
+                        <a:rPr>
+                          <a:solidFill>
+                            <a:schemeClr val="tx1"/>
+                          </a:solidFill>
+                          <a:latin typeface="CMU Serif"/>
+                          <a:ea typeface="CMU Serif"/>
+                          <a:cs typeface="CMU Serif"/>
+                        </a:rPr>
+                        <a:t>package</a:t>
+                      </a:r>
+                      <a:endParaRPr>
+                        <a:solidFill>
+                          <a:schemeClr val="tx1"/>
+                        </a:solidFill>
+                        <a:latin typeface="CMU Serif"/>
+                        <a:ea typeface="CMU Serif"/>
+                        <a:cs typeface="CMU Serif"/>
+                      </a:endParaRPr>
+                    </a:p>
+                  </a:txBody>
+                  <a:tcPr>
+                    <a:lnL w="12699" algn="ctr">
+                      <a:solidFill>
+                        <a:schemeClr val="tx1"/>
+                      </a:solidFill>
+                    </a:lnL>
+                    <a:lnR w="12699" algn="ctr">
+                      <a:solidFill>
+                        <a:schemeClr val="tx1"/>
+                      </a:solidFill>
+                    </a:lnR>
+                    <a:lnT w="12699" algn="ctr">
+                      <a:solidFill>
+                        <a:schemeClr val="tx1"/>
+                      </a:solidFill>
+                    </a:lnT>
+                    <a:lnB w="12699" algn="ctr">
+                      <a:solidFill>
+                        <a:schemeClr val="tx1"/>
+                      </a:solidFill>
+                    </a:lnB>
+                    <a:solidFill>
+                      <a:schemeClr val="bg1"/>
+                    </a:solidFill>
+                  </a:tcPr>
+                </a:tc>
+              </a:tr>
+              <a:tr h="311807">
+                <a:tc>
+                  <a:txBody>
+                    <a:bodyPr/>
+                    <a:p>
+                      <a:pPr>
+                        <a:defRPr/>
+                      </a:pPr>
+                      <a:r>
+                        <a:rPr>
+                          <a:solidFill>
+                            <a:schemeClr val="tx1"/>
+                          </a:solidFill>
+                          <a:latin typeface="CMU Serif"/>
+                          <a:ea typeface="CMU Serif"/>
+                          <a:cs typeface="CMU Serif"/>
+                        </a:rPr>
+                        <a:t>0xBB</a:t>
+                      </a:r>
+                      <a:endParaRPr>
+                        <a:solidFill>
+                          <a:schemeClr val="tx1"/>
+                        </a:solidFill>
+                        <a:latin typeface="CMU Serif"/>
+                        <a:ea typeface="CMU Serif"/>
+                        <a:cs typeface="CMU Serif"/>
+                      </a:endParaRPr>
+                    </a:p>
+                  </a:txBody>
+                  <a:tcPr>
+                    <a:lnL w="12699" algn="ctr">
+                      <a:solidFill>
+                        <a:schemeClr val="tx1"/>
+                      </a:solidFill>
+                    </a:lnL>
+                    <a:lnR w="12699" algn="ctr">
+                      <a:solidFill>
+                        <a:schemeClr val="tx1"/>
+                      </a:solidFill>
+                    </a:lnR>
+                    <a:lnT w="12699" algn="ctr">
+                      <a:solidFill>
+                        <a:schemeClr val="tx1"/>
+                      </a:solidFill>
+                    </a:lnT>
+                    <a:lnB w="12699" algn="ctr">
+                      <a:solidFill>
+                        <a:schemeClr val="tx1"/>
+                      </a:solidFill>
+                    </a:lnB>
+                    <a:solidFill>
+                      <a:schemeClr val="bg1"/>
+                    </a:solidFill>
+                  </a:tcPr>
+                </a:tc>
+              </a:tr>
+              <a:tr h="311807">
+                <a:tc>
+                  <a:txBody>
+                    <a:bodyPr/>
+                    <a:p>
+                      <a:pPr>
+                        <a:defRPr/>
+                      </a:pPr>
+                      <a:r>
+                        <a:rPr>
+                          <a:solidFill>
+                            <a:schemeClr val="tx1"/>
+                          </a:solidFill>
+                          <a:latin typeface="CMU Serif"/>
+                          <a:ea typeface="CMU Serif"/>
+                          <a:cs typeface="CMU Serif"/>
+                        </a:rPr>
+                        <a:t>0xAA</a:t>
+                      </a:r>
+                      <a:endParaRPr>
+                        <a:solidFill>
+                          <a:schemeClr val="tx1"/>
+                        </a:solidFill>
+                        <a:latin typeface="CMU Serif"/>
+                        <a:ea typeface="CMU Serif"/>
+                        <a:cs typeface="CMU Serif"/>
+                      </a:endParaRPr>
+                    </a:p>
+                  </a:txBody>
+                  <a:tcPr>
+                    <a:lnL w="12699" algn="ctr">
+                      <a:solidFill>
+                        <a:schemeClr val="tx1"/>
+                      </a:solidFill>
+                    </a:lnL>
+                    <a:lnR w="12699" algn="ctr">
+                      <a:solidFill>
+                        <a:schemeClr val="tx1"/>
+                      </a:solidFill>
+                    </a:lnR>
+                    <a:lnT w="12699" algn="ctr">
+                      <a:solidFill>
+                        <a:schemeClr val="tx1"/>
+                      </a:solidFill>
+                    </a:lnT>
+                    <a:lnB w="12699" algn="ctr">
+                      <a:solidFill>
+                        <a:schemeClr val="tx1"/>
+                      </a:solidFill>
+                    </a:lnB>
+                    <a:solidFill>
+                      <a:schemeClr val="bg1"/>
+                    </a:solidFill>
+                  </a:tcPr>
+                </a:tc>
+              </a:tr>
+              <a:tr h="311807">
+                <a:tc>
+                  <a:txBody>
+                    <a:bodyPr/>
+                    <a:p>
+                      <a:pPr>
+                        <a:defRPr/>
+                      </a:pPr>
+                      <a:r>
+                        <a:rPr>
+                          <a:solidFill>
+                            <a:schemeClr val="tx1"/>
+                          </a:solidFill>
+                          <a:latin typeface="CMU Serif"/>
+                          <a:ea typeface="CMU Serif"/>
+                          <a:cs typeface="CMU Serif"/>
+                        </a:rPr>
+                        <a:t>129</a:t>
+                      </a:r>
+                      <a:endParaRPr>
+                        <a:solidFill>
+                          <a:schemeClr val="tx1"/>
+                        </a:solidFill>
+                        <a:latin typeface="CMU Serif"/>
+                        <a:ea typeface="CMU Serif"/>
+                        <a:cs typeface="CMU Serif"/>
+                      </a:endParaRPr>
+                    </a:p>
+                  </a:txBody>
+                  <a:tcPr>
+                    <a:lnL w="12699" algn="ctr">
+                      <a:solidFill>
+                        <a:schemeClr val="tx1"/>
+                      </a:solidFill>
+                    </a:lnL>
+                    <a:lnR w="12699" algn="ctr">
+                      <a:solidFill>
+                        <a:schemeClr val="tx1"/>
+                      </a:solidFill>
+                    </a:lnR>
+                    <a:lnT w="12699" algn="ctr">
+                      <a:solidFill>
+                        <a:schemeClr val="tx1"/>
+                      </a:solidFill>
+                    </a:lnT>
+                    <a:lnB w="12699" algn="ctr">
+                      <a:solidFill>
+                        <a:schemeClr val="tx1"/>
+                      </a:solidFill>
+                    </a:lnB>
+                    <a:solidFill>
+                      <a:schemeClr val="bg1"/>
+                    </a:solidFill>
+                  </a:tcPr>
+                </a:tc>
+              </a:tr>
+              <a:tr h="311807">
+                <a:tc>
+                  <a:txBody>
+                    <a:bodyPr/>
+                    <a:p>
+                      <a:pPr>
+                        <a:defRPr/>
+                      </a:pPr>
+                      <a:r>
+                        <a:rPr>
+                          <a:solidFill>
+                            <a:schemeClr val="tx1"/>
+                          </a:solidFill>
+                          <a:latin typeface="CMU Serif"/>
+                          <a:ea typeface="CMU Serif"/>
+                          <a:cs typeface="CMU Serif"/>
+                        </a:rPr>
+                        <a:t>5</a:t>
+                      </a:r>
+                      <a:endParaRPr>
+                        <a:solidFill>
+                          <a:schemeClr val="tx1"/>
+                        </a:solidFill>
+                        <a:latin typeface="CMU Serif"/>
+                        <a:ea typeface="CMU Serif"/>
+                        <a:cs typeface="CMU Serif"/>
+                      </a:endParaRPr>
+                    </a:p>
+                  </a:txBody>
+                  <a:tcPr>
+                    <a:lnL w="12699" algn="ctr">
+                      <a:solidFill>
+                        <a:schemeClr val="tx1"/>
+                      </a:solidFill>
+                    </a:lnL>
+                    <a:lnR w="12699" algn="ctr">
+                      <a:solidFill>
+                        <a:schemeClr val="tx1"/>
+                      </a:solidFill>
+                    </a:lnR>
+                    <a:lnT w="12699" algn="ctr">
+                      <a:solidFill>
+                        <a:schemeClr val="tx1"/>
+                      </a:solidFill>
+                    </a:lnT>
+                    <a:lnB w="12699" algn="ctr">
+                      <a:solidFill>
+                        <a:schemeClr val="tx1"/>
+                      </a:solidFill>
+                    </a:lnB>
+                    <a:solidFill>
+                      <a:schemeClr val="bg1"/>
+                    </a:solidFill>
+                  </a:tcPr>
+                </a:tc>
+              </a:tr>
+              <a:tr h="311807">
+                <a:tc>
+                  <a:txBody>
+                    <a:bodyPr/>
+                    <a:p>
+                      <a:pPr>
+                        <a:defRPr/>
+                      </a:pPr>
+                      <a:r>
+                        <a:rPr>
+                          <a:solidFill>
+                            <a:schemeClr val="tx1"/>
+                          </a:solidFill>
+                          <a:latin typeface="CMU Serif"/>
+                          <a:ea typeface="CMU Serif"/>
+                          <a:cs typeface="CMU Serif"/>
+                        </a:rPr>
+                        <a:t>local (unencrypted)</a:t>
+                      </a:r>
+                      <a:endParaRPr>
+                        <a:solidFill>
+                          <a:schemeClr val="tx1"/>
+                        </a:solidFill>
+                        <a:latin typeface="CMU Serif"/>
+                        <a:ea typeface="CMU Serif"/>
+                        <a:cs typeface="CMU Serif"/>
+                      </a:endParaRPr>
+                    </a:p>
+                  </a:txBody>
+                  <a:tcPr>
+                    <a:lnL w="12699" algn="ctr">
+                      <a:solidFill>
+                        <a:schemeClr val="tx1"/>
+                      </a:solidFill>
+                    </a:lnL>
+                    <a:lnR w="12699" algn="ctr">
+                      <a:solidFill>
+                        <a:schemeClr val="tx1"/>
+                      </a:solidFill>
+                    </a:lnR>
+                    <a:lnT w="12699" algn="ctr">
+                      <a:solidFill>
+                        <a:schemeClr val="tx1"/>
+                      </a:solidFill>
+                    </a:lnT>
+                    <a:lnB w="12699" algn="ctr">
+                      <a:solidFill>
+                        <a:schemeClr val="tx1"/>
+                      </a:solidFill>
+                    </a:lnB>
+                    <a:solidFill>
+                      <a:schemeClr val="bg1"/>
+                    </a:solidFill>
+                  </a:tcPr>
+                </a:tc>
+              </a:tr>
+            </a:tbl>
+          </a:graphicData>
+        </a:graphic>
+      </p:graphicFrame>
+      <p:cxnSp>
+        <p:nvCxnSpPr>
+          <p:cNvPr id="5" name="" hidden="0"/>
+          <p:cNvCxnSpPr>
+            <a:cxnSpLocks/>
+            <a:stCxn id="4" idx="3"/>
+            <a:endCxn id="6" idx="1"/>
+          </p:cNvCxnSpPr>
+          <p:nvPr isPhoto="0" userDrawn="0"/>
+        </p:nvCxnSpPr>
+        <p:spPr bwMode="auto">
+          <a:xfrm rot="0" flipH="0" flipV="0">
+            <a:off x="2891943" y="1707673"/>
+            <a:ext cx="1924216" cy="0"/>
+          </a:xfrm>
+          <a:prstGeom prst="line">
+            <a:avLst/>
+          </a:prstGeom>
+          <a:ln w="19049" cap="flat" cmpd="sng" algn="ctr">
+            <a:solidFill>
+              <a:srgbClr val="000000"/>
+            </a:solidFill>
+            <a:prstDash val="lgDashDot"/>
+            <a:miter/>
+            <a:tailEnd type="arrow" len="med"/>
+          </a:ln>
+        </p:spPr>
+        <p:style>
+          <a:lnRef idx="1">
+            <a:schemeClr val="accent1">
+              <a:shade val="50000"/>
+            </a:schemeClr>
+          </a:lnRef>
+          <a:fillRef idx="0">
+            <a:schemeClr val="accent1"/>
+          </a:fillRef>
+          <a:effectRef idx="0">
+            <a:schemeClr val="accent1"/>
+          </a:effectRef>
+          <a:fontRef idx="minor">
+            <a:schemeClr val="tx1"/>
+          </a:fontRef>
+        </p:style>
+      </p:cxnSp>
+      <p:sp>
+        <p:nvSpPr>
+          <p:cNvPr id="6" name="" hidden="0"/>
+          <p:cNvSpPr/>
+          <p:nvPr isPhoto="0" userDrawn="0"/>
+        </p:nvSpPr>
+        <p:spPr bwMode="auto">
+          <a:xfrm flipH="0" flipV="0">
+            <a:off x="4816160" y="1134324"/>
+            <a:ext cx="2163927" cy="1146699"/>
+          </a:xfrm>
+          <a:prstGeom prst="rect">
+            <a:avLst/>
+          </a:prstGeom>
+          <a:solidFill>
+            <a:schemeClr val="bg1"/>
+          </a:solidFill>
+          <a:ln w="19049" cap="flat" cmpd="sng" algn="ctr">
+            <a:solidFill>
+              <a:schemeClr val="tx1"/>
+            </a:solidFill>
+            <a:prstDash val="solid"/>
+            <a:miter/>
+          </a:ln>
+        </p:spPr>
+        <p:style>
+          <a:lnRef idx="2">
+            <a:schemeClr val="accent1">
+              <a:shade val="50000"/>
+            </a:schemeClr>
+          </a:lnRef>
+          <a:fillRef idx="1">
+            <a:schemeClr val="accent1"/>
+          </a:fillRef>
+          <a:effectRef idx="0">
+            <a:schemeClr val="accent1"/>
+          </a:effectRef>
+          <a:fontRef idx="minor">
+            <a:schemeClr val="lt1"/>
+          </a:fontRef>
+        </p:style>
+        <p:txBody>
+          <a:bodyPr vertOverflow="overflow" horzOverflow="clip" vert="horz" wrap="square" lIns="91440" tIns="45720" rIns="91440" bIns="45720" numCol="1" spcCol="0" rtlCol="0" fromWordArt="0" anchor="ctr" anchorCtr="0" forceAA="0" upright="0" compatLnSpc="0"/>
+          <a:p>
+            <a:pPr algn="ctr">
+              <a:defRPr/>
+            </a:pPr>
+            <a:r>
+              <a:rPr i="0">
+                <a:solidFill>
+                  <a:schemeClr val="tx1"/>
+                </a:solidFill>
+                <a:latin typeface="CMU Serif"/>
+                <a:ea typeface="CMU Serif"/>
+                <a:cs typeface="CMU Serif"/>
+              </a:rPr>
+              <a:t>channel</a:t>
+            </a:r>
+            <a:endParaRPr i="0">
+              <a:solidFill>
+                <a:schemeClr val="tx1"/>
+              </a:solidFill>
+              <a:latin typeface="CMU Serif"/>
+              <a:ea typeface="CMU Serif"/>
+              <a:cs typeface="CMU Serif"/>
+            </a:endParaRPr>
+          </a:p>
+        </p:txBody>
+      </p:sp>
+      <p:sp>
+        <p:nvSpPr>
+          <p:cNvPr id="7" name="" hidden="0"/>
+          <p:cNvSpPr/>
+          <p:nvPr isPhoto="0" userDrawn="0"/>
+        </p:nvSpPr>
+        <p:spPr bwMode="auto">
+          <a:xfrm flipH="0" flipV="0">
+            <a:off x="596840" y="4169970"/>
+            <a:ext cx="2163927" cy="1146699"/>
+          </a:xfrm>
+          <a:prstGeom prst="rect">
+            <a:avLst/>
+          </a:prstGeom>
+          <a:solidFill>
+            <a:schemeClr val="bg1"/>
+          </a:solidFill>
+          <a:ln w="19049" cap="flat" cmpd="sng" algn="ctr">
+            <a:solidFill>
+              <a:schemeClr val="tx1"/>
+            </a:solidFill>
+            <a:prstDash val="solid"/>
+            <a:miter/>
+          </a:ln>
+        </p:spPr>
+        <p:style>
+          <a:lnRef idx="2">
+            <a:schemeClr val="accent1">
+              <a:shade val="50000"/>
+            </a:schemeClr>
+          </a:lnRef>
+          <a:fillRef idx="1">
+            <a:schemeClr val="accent1"/>
+          </a:fillRef>
+          <a:effectRef idx="0">
+            <a:schemeClr val="accent1"/>
+          </a:effectRef>
+          <a:fontRef idx="minor">
+            <a:schemeClr val="lt1"/>
+          </a:fontRef>
+        </p:style>
+        <p:txBody>
+          <a:bodyPr vertOverflow="overflow" horzOverflow="clip" vert="horz" wrap="square" lIns="91440" tIns="45720" rIns="91440" bIns="45720" numCol="1" spcCol="0" rtlCol="0" fromWordArt="0" anchor="ctr" anchorCtr="0" forceAA="0" upright="0" compatLnSpc="0"/>
+          <a:p>
+            <a:pPr algn="ctr">
+              <a:defRPr/>
+            </a:pPr>
+            <a:r>
+              <a:rPr i="0">
+                <a:solidFill>
+                  <a:schemeClr val="tx1"/>
+                </a:solidFill>
+                <a:latin typeface="CMU Serif"/>
+                <a:ea typeface="CMU Serif"/>
+                <a:cs typeface="CMU Serif"/>
+              </a:rPr>
+              <a:t>package status</a:t>
+            </a:r>
+            <a:endParaRPr i="0">
+              <a:solidFill>
+                <a:schemeClr val="tx1"/>
+              </a:solidFill>
+              <a:latin typeface="CMU Serif"/>
+              <a:ea typeface="CMU Serif"/>
+              <a:cs typeface="CMU Serif"/>
+            </a:endParaRPr>
+          </a:p>
+        </p:txBody>
+      </p:sp>
+      <p:sp>
+        <p:nvSpPr>
+          <p:cNvPr id="8" name="" hidden="0"/>
+          <p:cNvSpPr/>
+          <p:nvPr isPhoto="0" userDrawn="0"/>
+        </p:nvSpPr>
+        <p:spPr bwMode="auto">
+          <a:xfrm flipH="0" flipV="0">
+            <a:off x="3462815" y="4169970"/>
+            <a:ext cx="2163927" cy="1146699"/>
+          </a:xfrm>
+          <a:prstGeom prst="rect">
+            <a:avLst/>
+          </a:prstGeom>
+          <a:solidFill>
+            <a:schemeClr val="bg1"/>
+          </a:solidFill>
+          <a:ln w="19049" cap="flat" cmpd="sng" algn="ctr">
+            <a:solidFill>
+              <a:schemeClr val="tx1"/>
+            </a:solidFill>
+            <a:prstDash val="solid"/>
+            <a:miter/>
+          </a:ln>
+        </p:spPr>
+        <p:style>
+          <a:lnRef idx="2">
+            <a:schemeClr val="accent1">
+              <a:shade val="50000"/>
+            </a:schemeClr>
+          </a:lnRef>
+          <a:fillRef idx="1">
+            <a:schemeClr val="accent1"/>
+          </a:fillRef>
+          <a:effectRef idx="0">
+            <a:schemeClr val="accent1"/>
+          </a:effectRef>
+          <a:fontRef idx="minor">
+            <a:schemeClr val="lt1"/>
+          </a:fontRef>
+        </p:style>
+        <p:txBody>
+          <a:bodyPr vertOverflow="overflow" horzOverflow="clip" vert="horz" wrap="square" lIns="91440" tIns="45720" rIns="91440" bIns="45720" numCol="1" spcCol="0" rtlCol="0" fromWordArt="0" anchor="ctr" anchorCtr="0" forceAA="0" upright="0" compatLnSpc="0"/>
+          <a:p>
+            <a:pPr algn="ctr">
+              <a:defRPr/>
+            </a:pPr>
+            <a:r>
+              <a:rPr i="0">
+                <a:solidFill>
+                  <a:schemeClr val="tx1"/>
+                </a:solidFill>
+                <a:latin typeface="CMU Serif"/>
+                <a:ea typeface="CMU Serif"/>
+                <a:cs typeface="CMU Serif"/>
+              </a:rPr>
+              <a:t>channel</a:t>
+            </a:r>
+            <a:endParaRPr i="0">
+              <a:solidFill>
+                <a:schemeClr val="tx1"/>
+              </a:solidFill>
+              <a:latin typeface="CMU Serif"/>
+              <a:ea typeface="CMU Serif"/>
+              <a:cs typeface="CMU Serif"/>
+            </a:endParaRPr>
+          </a:p>
+          <a:p>
+            <a:pPr algn="ctr">
+              <a:defRPr/>
+            </a:pPr>
+            <a:r>
+              <a:rPr i="0">
+                <a:solidFill>
+                  <a:schemeClr val="tx1"/>
+                </a:solidFill>
+                <a:latin typeface="CMU Serif"/>
+                <a:ea typeface="CMU Serif"/>
+                <a:cs typeface="CMU Serif"/>
+              </a:rPr>
+              <a:t>response </a:t>
+            </a:r>
+            <a:endParaRPr i="0">
+              <a:solidFill>
+                <a:schemeClr val="tx1"/>
+              </a:solidFill>
+              <a:latin typeface="CMU Serif"/>
+              <a:ea typeface="CMU Serif"/>
+              <a:cs typeface="CMU Serif"/>
+            </a:endParaRPr>
+          </a:p>
+          <a:p>
+            <a:pPr algn="ctr">
+              <a:defRPr/>
+            </a:pPr>
+            <a:r>
+              <a:rPr i="0">
+                <a:solidFill>
+                  <a:schemeClr val="tx1"/>
+                </a:solidFill>
+                <a:latin typeface="CMU Serif"/>
+                <a:ea typeface="CMU Serif"/>
+                <a:cs typeface="CMU Serif"/>
+              </a:rPr>
+              <a:t>(confirmation)</a:t>
+            </a:r>
+            <a:endParaRPr i="0">
+              <a:solidFill>
+                <a:schemeClr val="tx1"/>
+              </a:solidFill>
+              <a:latin typeface="CMU Serif"/>
+              <a:ea typeface="CMU Serif"/>
+              <a:cs typeface="CMU Serif"/>
+            </a:endParaRPr>
+          </a:p>
+        </p:txBody>
+      </p:sp>
+      <p:cxnSp>
+        <p:nvCxnSpPr>
+          <p:cNvPr id="9" name="" hidden="0"/>
+          <p:cNvCxnSpPr>
+            <a:cxnSpLocks/>
+            <a:stCxn id="4" idx="2"/>
+            <a:endCxn id="7" idx="0"/>
+          </p:cNvCxnSpPr>
+          <p:nvPr isPhoto="0" userDrawn="0"/>
+        </p:nvCxnSpPr>
+        <p:spPr bwMode="auto">
+          <a:xfrm rot="5399978" flipH="0" flipV="0">
+            <a:off x="1018521" y="3509687"/>
+            <a:ext cx="1320567" cy="0"/>
+          </a:xfrm>
+          <a:prstGeom prst="line">
+            <a:avLst/>
+          </a:prstGeom>
+          <a:ln w="19049" cap="flat" cmpd="sng" algn="ctr">
+            <a:solidFill>
+              <a:schemeClr val="tx1"/>
+            </a:solidFill>
+            <a:prstDash val="solid"/>
+            <a:miter/>
+            <a:tailEnd type="arrow" len="med"/>
+          </a:ln>
+        </p:spPr>
+        <p:style>
+          <a:lnRef idx="1">
+            <a:schemeClr val="accent1">
+              <a:shade val="50000"/>
+            </a:schemeClr>
+          </a:lnRef>
+          <a:fillRef idx="0">
+            <a:schemeClr val="accent1"/>
+          </a:fillRef>
+          <a:effectRef idx="0">
+            <a:schemeClr val="accent1"/>
+          </a:effectRef>
+          <a:fontRef idx="minor">
+            <a:schemeClr val="tx1"/>
+          </a:fontRef>
+        </p:style>
+      </p:cxnSp>
+      <p:sp>
+        <p:nvSpPr>
+          <p:cNvPr id="10" name="" hidden="0"/>
+          <p:cNvSpPr/>
+          <p:nvPr isPhoto="0" userDrawn="0"/>
+        </p:nvSpPr>
+        <p:spPr bwMode="auto">
+          <a:xfrm flipH="0" flipV="0">
+            <a:off x="3462815" y="2936337"/>
+            <a:ext cx="2163927" cy="1146699"/>
+          </a:xfrm>
+          <a:prstGeom prst="rect">
+            <a:avLst/>
+          </a:prstGeom>
+          <a:solidFill>
+            <a:schemeClr val="bg1"/>
+          </a:solidFill>
+          <a:ln w="19049" cap="flat" cmpd="sng" algn="ctr">
+            <a:solidFill>
+              <a:schemeClr val="tx1"/>
+            </a:solidFill>
+            <a:prstDash val="solid"/>
+            <a:miter/>
+          </a:ln>
+        </p:spPr>
+        <p:style>
+          <a:lnRef idx="2">
+            <a:schemeClr val="accent1">
+              <a:shade val="50000"/>
+            </a:schemeClr>
+          </a:lnRef>
+          <a:fillRef idx="1">
+            <a:schemeClr val="accent1"/>
+          </a:fillRef>
+          <a:effectRef idx="0">
+            <a:schemeClr val="accent1"/>
+          </a:effectRef>
+          <a:fontRef idx="minor">
+            <a:schemeClr val="lt1"/>
+          </a:fontRef>
+        </p:style>
+        <p:txBody>
+          <a:bodyPr vertOverflow="overflow" horzOverflow="clip" vert="horz" wrap="square" lIns="91440" tIns="45720" rIns="91440" bIns="45720" numCol="1" spcCol="0" rtlCol="0" fromWordArt="0" anchor="ctr" anchorCtr="0" forceAA="0" upright="0" compatLnSpc="0"/>
+          <a:p>
+            <a:pPr algn="ctr">
+              <a:defRPr/>
+            </a:pPr>
+            <a:r>
+              <a:rPr i="0">
+                <a:solidFill>
+                  <a:schemeClr val="tx1"/>
+                </a:solidFill>
+                <a:latin typeface="CMU Serif"/>
+                <a:ea typeface="CMU Serif"/>
+                <a:cs typeface="CMU Serif"/>
+              </a:rPr>
+              <a:t>no</a:t>
+            </a:r>
+            <a:r>
+              <a:rPr i="0">
+                <a:solidFill>
+                  <a:schemeClr val="tx1"/>
+                </a:solidFill>
+                <a:latin typeface="CMU Serif"/>
+                <a:ea typeface="CMU Serif"/>
+                <a:cs typeface="CMU Serif"/>
+              </a:rPr>
+              <a:t> channel</a:t>
+            </a:r>
+            <a:endParaRPr i="0">
+              <a:solidFill>
+                <a:schemeClr val="tx1"/>
+              </a:solidFill>
+              <a:latin typeface="CMU Serif"/>
+              <a:ea typeface="CMU Serif"/>
+              <a:cs typeface="CMU Serif"/>
+            </a:endParaRPr>
+          </a:p>
+          <a:p>
+            <a:pPr algn="ctr">
+              <a:defRPr/>
+            </a:pPr>
+            <a:r>
+              <a:rPr i="0">
+                <a:solidFill>
+                  <a:schemeClr val="tx1"/>
+                </a:solidFill>
+                <a:latin typeface="CMU Serif"/>
+                <a:ea typeface="CMU Serif"/>
+                <a:cs typeface="CMU Serif"/>
+              </a:rPr>
+              <a:t>response</a:t>
+            </a:r>
+            <a:endParaRPr i="0">
+              <a:solidFill>
+                <a:schemeClr val="tx1"/>
+              </a:solidFill>
+              <a:latin typeface="CMU Serif"/>
+              <a:ea typeface="CMU Serif"/>
+              <a:cs typeface="CMU Serif"/>
+            </a:endParaRPr>
+          </a:p>
+        </p:txBody>
+      </p:sp>
+      <p:sp>
+        <p:nvSpPr>
+          <p:cNvPr id="11" name="" hidden="0"/>
+          <p:cNvSpPr/>
+          <p:nvPr isPhoto="0" userDrawn="0"/>
+        </p:nvSpPr>
+        <p:spPr bwMode="auto">
+          <a:xfrm flipH="0" flipV="0">
+            <a:off x="3462815" y="5402254"/>
+            <a:ext cx="2163927" cy="1146699"/>
+          </a:xfrm>
+          <a:prstGeom prst="rect">
+            <a:avLst/>
+          </a:prstGeom>
+          <a:solidFill>
+            <a:schemeClr val="bg1"/>
+          </a:solidFill>
+          <a:ln w="19049" cap="flat" cmpd="sng" algn="ctr">
+            <a:solidFill>
+              <a:schemeClr val="tx1"/>
+            </a:solidFill>
+            <a:prstDash val="solid"/>
+            <a:miter/>
+          </a:ln>
+        </p:spPr>
+        <p:style>
+          <a:lnRef idx="2">
+            <a:schemeClr val="accent1">
+              <a:shade val="50000"/>
+            </a:schemeClr>
+          </a:lnRef>
+          <a:fillRef idx="1">
+            <a:schemeClr val="accent1"/>
+          </a:fillRef>
+          <a:effectRef idx="0">
+            <a:schemeClr val="accent1"/>
+          </a:effectRef>
+          <a:fontRef idx="minor">
+            <a:schemeClr val="lt1"/>
+          </a:fontRef>
+        </p:style>
+        <p:txBody>
+          <a:bodyPr vertOverflow="overflow" horzOverflow="clip" vert="horz" wrap="square" lIns="91440" tIns="45720" rIns="91440" bIns="45720" numCol="1" spcCol="0" rtlCol="0" fromWordArt="0" anchor="ctr" anchorCtr="0" forceAA="0" upright="0" compatLnSpc="0"/>
+          <a:p>
+            <a:pPr algn="ctr">
+              <a:defRPr/>
+            </a:pPr>
+            <a:r>
+              <a:rPr i="0">
+                <a:solidFill>
+                  <a:schemeClr val="tx1"/>
+                </a:solidFill>
+                <a:latin typeface="CMU Serif"/>
+                <a:ea typeface="CMU Serif"/>
+                <a:cs typeface="CMU Serif"/>
+              </a:rPr>
+              <a:t>channel</a:t>
+            </a:r>
+            <a:endParaRPr i="0">
+              <a:solidFill>
+                <a:schemeClr val="tx1"/>
+              </a:solidFill>
+              <a:latin typeface="CMU Serif"/>
+              <a:ea typeface="CMU Serif"/>
+              <a:cs typeface="CMU Serif"/>
+            </a:endParaRPr>
+          </a:p>
+          <a:p>
+            <a:pPr algn="ctr">
+              <a:defRPr/>
+            </a:pPr>
+            <a:r>
+              <a:rPr i="0">
+                <a:solidFill>
+                  <a:schemeClr val="tx1"/>
+                </a:solidFill>
+                <a:latin typeface="CMU Serif"/>
+                <a:ea typeface="CMU Serif"/>
+                <a:cs typeface="CMU Serif"/>
+              </a:rPr>
+              <a:t>response</a:t>
+            </a:r>
+            <a:endParaRPr i="0">
+              <a:solidFill>
+                <a:schemeClr val="tx1"/>
+              </a:solidFill>
+              <a:latin typeface="CMU Serif"/>
+              <a:ea typeface="CMU Serif"/>
+              <a:cs typeface="CMU Serif"/>
+            </a:endParaRPr>
+          </a:p>
+          <a:p>
+            <a:pPr algn="ctr">
+              <a:defRPr/>
+            </a:pPr>
+            <a:r>
+              <a:rPr i="0">
+                <a:solidFill>
+                  <a:schemeClr val="tx1"/>
+                </a:solidFill>
+                <a:latin typeface="CMU Serif"/>
+                <a:ea typeface="CMU Serif"/>
+                <a:cs typeface="CMU Serif"/>
+              </a:rPr>
+              <a:t>(resent request)</a:t>
+            </a:r>
+            <a:endParaRPr i="0">
+              <a:solidFill>
+                <a:schemeClr val="tx1"/>
+              </a:solidFill>
+              <a:latin typeface="CMU Serif"/>
+              <a:ea typeface="CMU Serif"/>
+              <a:cs typeface="CMU Serif"/>
+            </a:endParaRPr>
+          </a:p>
+        </p:txBody>
+      </p:sp>
+      <p:cxnSp>
+        <p:nvCxnSpPr>
+          <p:cNvPr id="12" name="" hidden="0"/>
+          <p:cNvCxnSpPr>
+            <a:cxnSpLocks/>
+            <a:stCxn id="7" idx="3"/>
+            <a:endCxn id="10" idx="1"/>
+          </p:cNvCxnSpPr>
+          <p:nvPr isPhoto="0" userDrawn="0"/>
+        </p:nvCxnSpPr>
+        <p:spPr bwMode="auto">
+          <a:xfrm rot="0" flipH="0" flipV="1">
+            <a:off x="2760768" y="3509687"/>
+            <a:ext cx="702046" cy="1233632"/>
+          </a:xfrm>
+          <a:prstGeom prst="line">
+            <a:avLst/>
+          </a:prstGeom>
+          <a:ln w="19049" cap="flat" cmpd="sng" algn="ctr">
+            <a:solidFill>
+              <a:schemeClr val="tx1"/>
+            </a:solidFill>
+            <a:prstDash val="solid"/>
+            <a:miter/>
+            <a:tailEnd type="arrow" len="med"/>
+          </a:ln>
+        </p:spPr>
+        <p:style>
+          <a:lnRef idx="1">
+            <a:schemeClr val="accent1">
+              <a:shade val="50000"/>
+            </a:schemeClr>
+          </a:lnRef>
+          <a:fillRef idx="0">
+            <a:schemeClr val="accent1"/>
+          </a:fillRef>
+          <a:effectRef idx="0">
+            <a:schemeClr val="accent1"/>
+          </a:effectRef>
+          <a:fontRef idx="minor">
+            <a:schemeClr val="tx1"/>
+          </a:fontRef>
+        </p:style>
+      </p:cxnSp>
+      <p:cxnSp>
+        <p:nvCxnSpPr>
+          <p:cNvPr id="13" name="" hidden="0"/>
+          <p:cNvCxnSpPr>
+            <a:cxnSpLocks/>
+            <a:stCxn id="12" idx="0"/>
+            <a:endCxn id="8" idx="1"/>
+          </p:cNvCxnSpPr>
+          <p:nvPr isPhoto="0" userDrawn="0"/>
+        </p:nvCxnSpPr>
+        <p:spPr bwMode="auto">
+          <a:xfrm rot="16199969" flipH="0" flipV="0">
+            <a:off x="3111792" y="4392297"/>
+            <a:ext cx="0" cy="702046"/>
+          </a:xfrm>
+          <a:prstGeom prst="line">
+            <a:avLst/>
+          </a:prstGeom>
+          <a:ln w="19049" cap="flat" cmpd="sng" algn="ctr">
+            <a:solidFill>
+              <a:schemeClr val="tx1"/>
+            </a:solidFill>
+            <a:prstDash val="solid"/>
+            <a:miter/>
+            <a:tailEnd type="arrow" len="med"/>
+          </a:ln>
+        </p:spPr>
+        <p:style>
+          <a:lnRef idx="1">
+            <a:schemeClr val="accent1">
+              <a:shade val="50000"/>
+            </a:schemeClr>
+          </a:lnRef>
+          <a:fillRef idx="0">
+            <a:schemeClr val="accent1"/>
+          </a:fillRef>
+          <a:effectRef idx="0">
+            <a:schemeClr val="accent1"/>
+          </a:effectRef>
+          <a:fontRef idx="minor">
+            <a:schemeClr val="tx1"/>
+          </a:fontRef>
+        </p:style>
+      </p:cxnSp>
+      <p:cxnSp>
+        <p:nvCxnSpPr>
+          <p:cNvPr id="14" name="" hidden="0"/>
+          <p:cNvCxnSpPr>
+            <a:cxnSpLocks/>
+            <a:stCxn id="13" idx="0"/>
+            <a:endCxn id="11" idx="1"/>
+          </p:cNvCxnSpPr>
+          <p:nvPr isPhoto="0" userDrawn="0"/>
+        </p:nvCxnSpPr>
+        <p:spPr bwMode="auto">
+          <a:xfrm rot="0" flipH="0" flipV="0">
+            <a:off x="2760768" y="4743320"/>
+            <a:ext cx="702046" cy="1232283"/>
+          </a:xfrm>
+          <a:prstGeom prst="line">
+            <a:avLst/>
+          </a:prstGeom>
+          <a:ln w="19049" cap="flat" cmpd="sng" algn="ctr">
+            <a:solidFill>
+              <a:schemeClr val="tx1"/>
+            </a:solidFill>
+            <a:prstDash val="solid"/>
+            <a:miter/>
+            <a:tailEnd type="arrow" len="med"/>
+          </a:ln>
+        </p:spPr>
+        <p:style>
+          <a:lnRef idx="1">
+            <a:schemeClr val="accent1">
+              <a:shade val="50000"/>
+            </a:schemeClr>
+          </a:lnRef>
+          <a:fillRef idx="0">
+            <a:schemeClr val="accent1"/>
+          </a:fillRef>
+          <a:effectRef idx="0">
+            <a:schemeClr val="accent1"/>
+          </a:effectRef>
+          <a:fontRef idx="minor">
+            <a:schemeClr val="tx1"/>
+          </a:fontRef>
+        </p:style>
+      </p:cxnSp>
+      <p:graphicFrame>
+        <p:nvGraphicFramePr>
+          <p:cNvPr id="15" name="" hidden="0"/>
+          <p:cNvGraphicFramePr>
+            <a:graphicFrameLocks xmlns:a="http://schemas.openxmlformats.org/drawingml/2006/main"/>
+          </p:cNvGraphicFramePr>
+          <p:nvPr isPhoto="0" userDrawn="0"/>
+        </p:nvGraphicFramePr>
+        <p:xfrm>
+          <a:off x="9252478" y="1794607"/>
+          <a:ext cx="2426275" cy="2283459"/>
+        </p:xfrm>
+        <a:graphic>
+          <a:graphicData uri="http://schemas.openxmlformats.org/drawingml/2006/table">
+            <a:tbl>
+              <a:tblPr firstRow="1" firstCol="0" lastRow="0" lastCol="0" bandRow="1" bandCol="0">
+                <a:tableStyleId>{B8CBBEDC-A73A-6342-AF84-C5CCFE4BA3C3}</a:tableStyleId>
+              </a:tblPr>
+              <a:tblGrid>
+                <a:gridCol w="2413575"/>
+              </a:tblGrid>
+              <a:tr h="311806">
+                <a:tc>
+                  <a:txBody>
+                    <a:bodyPr/>
+                    <a:p>
+                      <a:pPr algn="ctr">
+                        <a:defRPr/>
+                      </a:pPr>
+                      <a:r>
+                        <a:rPr>
+                          <a:solidFill>
+                            <a:schemeClr val="tx1"/>
+                          </a:solidFill>
+                          <a:latin typeface="CMU Serif"/>
+                          <a:ea typeface="CMU Serif"/>
+                          <a:cs typeface="CMU Serif"/>
+                        </a:rPr>
+                        <a:t>package</a:t>
+                      </a:r>
+                      <a:endParaRPr>
+                        <a:solidFill>
+                          <a:schemeClr val="tx1"/>
+                        </a:solidFill>
+                        <a:latin typeface="CMU Serif"/>
+                        <a:ea typeface="CMU Serif"/>
+                        <a:cs typeface="CMU Serif"/>
+                      </a:endParaRPr>
+                    </a:p>
+                  </a:txBody>
+                  <a:tcPr>
+                    <a:lnL w="12699" algn="ctr">
+                      <a:solidFill>
+                        <a:schemeClr val="tx1"/>
+                      </a:solidFill>
+                    </a:lnL>
+                    <a:lnR w="12699" algn="ctr">
+                      <a:solidFill>
+                        <a:schemeClr val="tx1"/>
+                      </a:solidFill>
+                    </a:lnR>
+                    <a:lnT w="12699" algn="ctr">
+                      <a:solidFill>
+                        <a:schemeClr val="tx1"/>
+                      </a:solidFill>
+                    </a:lnT>
+                    <a:lnB w="12699" algn="ctr">
+                      <a:solidFill>
+                        <a:schemeClr val="tx1"/>
+                      </a:solidFill>
+                    </a:lnB>
+                    <a:solidFill>
+                      <a:schemeClr val="bg1"/>
+                    </a:solidFill>
+                  </a:tcPr>
+                </a:tc>
+              </a:tr>
+              <a:tr h="311806">
+                <a:tc>
+                  <a:txBody>
+                    <a:bodyPr/>
+                    <a:p>
+                      <a:pPr>
+                        <a:defRPr/>
+                      </a:pPr>
+                      <a:r>
+                        <a:rPr>
+                          <a:solidFill>
+                            <a:schemeClr val="tx1"/>
+                          </a:solidFill>
+                          <a:latin typeface="CMU Serif"/>
+                          <a:ea typeface="CMU Serif"/>
+                          <a:cs typeface="CMU Serif"/>
+                        </a:rPr>
+                        <a:t>0xAA</a:t>
+                      </a:r>
+                      <a:endParaRPr>
+                        <a:solidFill>
+                          <a:schemeClr val="tx1"/>
+                        </a:solidFill>
+                        <a:latin typeface="CMU Serif"/>
+                        <a:ea typeface="CMU Serif"/>
+                        <a:cs typeface="CMU Serif"/>
+                      </a:endParaRPr>
+                    </a:p>
+                  </a:txBody>
+                  <a:tcPr>
+                    <a:lnL w="12699" algn="ctr">
+                      <a:solidFill>
+                        <a:schemeClr val="tx1"/>
+                      </a:solidFill>
+                    </a:lnL>
+                    <a:lnR w="12699" algn="ctr">
+                      <a:solidFill>
+                        <a:schemeClr val="tx1"/>
+                      </a:solidFill>
+                    </a:lnR>
+                    <a:lnT w="12699" algn="ctr">
+                      <a:solidFill>
+                        <a:schemeClr val="tx1"/>
+                      </a:solidFill>
+                    </a:lnT>
+                    <a:lnB w="12699" algn="ctr">
+                      <a:solidFill>
+                        <a:schemeClr val="tx1"/>
+                      </a:solidFill>
+                    </a:lnB>
+                    <a:solidFill>
+                      <a:schemeClr val="bg1"/>
+                    </a:solidFill>
+                  </a:tcPr>
+                </a:tc>
+              </a:tr>
+              <a:tr h="311806">
+                <a:tc>
+                  <a:txBody>
+                    <a:bodyPr/>
+                    <a:p>
+                      <a:pPr>
+                        <a:defRPr/>
+                      </a:pPr>
+                      <a:r>
+                        <a:rPr>
+                          <a:solidFill>
+                            <a:schemeClr val="tx1"/>
+                          </a:solidFill>
+                          <a:latin typeface="CMU Serif"/>
+                          <a:ea typeface="CMU Serif"/>
+                          <a:cs typeface="CMU Serif"/>
+                        </a:rPr>
+                        <a:t>0xBB</a:t>
+                      </a:r>
+                      <a:endParaRPr>
+                        <a:solidFill>
+                          <a:schemeClr val="tx1"/>
+                        </a:solidFill>
+                        <a:latin typeface="CMU Serif"/>
+                        <a:ea typeface="CMU Serif"/>
+                        <a:cs typeface="CMU Serif"/>
+                      </a:endParaRPr>
+                    </a:p>
+                  </a:txBody>
+                  <a:tcPr>
+                    <a:lnL w="12699" algn="ctr">
+                      <a:solidFill>
+                        <a:schemeClr val="tx1"/>
+                      </a:solidFill>
+                    </a:lnL>
+                    <a:lnR w="12699" algn="ctr">
+                      <a:solidFill>
+                        <a:schemeClr val="tx1"/>
+                      </a:solidFill>
+                    </a:lnR>
+                    <a:lnT w="12699" algn="ctr">
+                      <a:solidFill>
+                        <a:schemeClr val="tx1"/>
+                      </a:solidFill>
+                    </a:lnT>
+                    <a:lnB w="12699" algn="ctr">
+                      <a:solidFill>
+                        <a:schemeClr val="tx1"/>
+                      </a:solidFill>
+                    </a:lnB>
+                    <a:solidFill>
+                      <a:schemeClr val="bg1"/>
+                    </a:solidFill>
+                  </a:tcPr>
+                </a:tc>
+              </a:tr>
+              <a:tr h="311806">
+                <a:tc>
+                  <a:txBody>
+                    <a:bodyPr/>
+                    <a:p>
+                      <a:pPr>
+                        <a:defRPr/>
+                      </a:pPr>
+                      <a:r>
+                        <a:rPr>
+                          <a:solidFill>
+                            <a:schemeClr val="tx1"/>
+                          </a:solidFill>
+                          <a:latin typeface="CMU Serif"/>
+                          <a:ea typeface="CMU Serif"/>
+                          <a:cs typeface="CMU Serif"/>
+                        </a:rPr>
+                        <a:t>56</a:t>
+                      </a:r>
+                      <a:endParaRPr>
+                        <a:solidFill>
+                          <a:schemeClr val="tx1"/>
+                        </a:solidFill>
+                        <a:latin typeface="CMU Serif"/>
+                        <a:ea typeface="CMU Serif"/>
+                        <a:cs typeface="CMU Serif"/>
+                      </a:endParaRPr>
+                    </a:p>
+                  </a:txBody>
+                  <a:tcPr>
+                    <a:lnL w="12699" algn="ctr">
+                      <a:solidFill>
+                        <a:schemeClr val="tx1"/>
+                      </a:solidFill>
+                    </a:lnL>
+                    <a:lnR w="12699" algn="ctr">
+                      <a:solidFill>
+                        <a:schemeClr val="tx1"/>
+                      </a:solidFill>
+                    </a:lnR>
+                    <a:lnT w="12699" algn="ctr">
+                      <a:solidFill>
+                        <a:schemeClr val="tx1"/>
+                      </a:solidFill>
+                    </a:lnT>
+                    <a:lnB w="12699" algn="ctr">
+                      <a:solidFill>
+                        <a:schemeClr val="tx1"/>
+                      </a:solidFill>
+                    </a:lnB>
+                    <a:solidFill>
+                      <a:schemeClr val="bg1"/>
+                    </a:solidFill>
+                  </a:tcPr>
+                </a:tc>
+              </a:tr>
+              <a:tr h="311806">
+                <a:tc>
+                  <a:txBody>
+                    <a:bodyPr/>
+                    <a:p>
+                      <a:pPr>
+                        <a:defRPr/>
+                      </a:pPr>
+                      <a:r>
+                        <a:rPr lang="en-US" sz="1800" b="0" i="0" u="none" strike="noStrike" cap="none" spc="0">
+                          <a:solidFill>
+                            <a:schemeClr val="tx1"/>
+                          </a:solidFill>
+                          <a:latin typeface="CMU Serif"/>
+                          <a:ea typeface="CMU Serif"/>
+                          <a:cs typeface="CMU Serif"/>
+                        </a:rPr>
+                        <a:t>8</a:t>
+                      </a:r>
+                      <a:endParaRPr>
+                        <a:solidFill>
+                          <a:schemeClr val="tx1"/>
+                        </a:solidFill>
+                        <a:latin typeface="CMU Serif"/>
+                        <a:ea typeface="CMU Serif"/>
+                        <a:cs typeface="CMU Serif"/>
+                      </a:endParaRPr>
+                    </a:p>
+                  </a:txBody>
+                  <a:tcPr>
+                    <a:lnL w="12699" algn="ctr">
+                      <a:solidFill>
+                        <a:schemeClr val="tx1"/>
+                      </a:solidFill>
+                    </a:lnL>
+                    <a:lnR w="12699" algn="ctr">
+                      <a:solidFill>
+                        <a:schemeClr val="tx1"/>
+                      </a:solidFill>
+                    </a:lnR>
+                    <a:lnT w="12699" algn="ctr">
+                      <a:solidFill>
+                        <a:schemeClr val="tx1"/>
+                      </a:solidFill>
+                    </a:lnT>
+                    <a:lnB w="12699" algn="ctr">
+                      <a:solidFill>
+                        <a:schemeClr val="tx1"/>
+                      </a:solidFill>
+                    </a:lnB>
+                    <a:solidFill>
+                      <a:schemeClr val="bg1"/>
+                    </a:solidFill>
+                  </a:tcPr>
+                </a:tc>
+              </a:tr>
+              <a:tr h="311806">
+                <a:tc>
+                  <a:txBody>
+                    <a:bodyPr/>
+                    <a:p>
+                      <a:pPr>
+                        <a:defRPr/>
+                      </a:pPr>
+                      <a:r>
+                        <a:rPr lang="en-US" sz="1800" b="0" i="0" u="none" strike="noStrike" cap="none" spc="0">
+                          <a:solidFill>
+                            <a:schemeClr val="tx1"/>
+                          </a:solidFill>
+                          <a:latin typeface="CMU Serif"/>
+                          <a:ea typeface="CMU Serif"/>
+                          <a:cs typeface="CMU Serif"/>
+                        </a:rPr>
+                        <a:t>received </a:t>
+                      </a:r>
+                      <a:r>
+                        <a:rPr lang="en-US" sz="1800" b="0" i="0" u="none" strike="noStrike" cap="none" spc="0">
+                          <a:solidFill>
+                            <a:schemeClr val="tx1"/>
+                          </a:solidFill>
+                          <a:latin typeface="CMU Serif"/>
+                          <a:ea typeface="CMU Serif"/>
+                          <a:cs typeface="CMU Serif"/>
+                        </a:rPr>
+                        <a:t>(unencrpt.)</a:t>
+                      </a:r>
+                      <a:endParaRPr>
+                        <a:solidFill>
+                          <a:schemeClr val="tx1"/>
+                        </a:solidFill>
+                        <a:latin typeface="CMU Serif"/>
+                        <a:ea typeface="CMU Serif"/>
+                        <a:cs typeface="CMU Serif"/>
+                      </a:endParaRPr>
+                    </a:p>
+                  </a:txBody>
+                  <a:tcPr>
+                    <a:lnL w="12699" algn="ctr">
+                      <a:solidFill>
+                        <a:schemeClr val="tx1"/>
+                      </a:solidFill>
+                    </a:lnL>
+                    <a:lnR w="12699" algn="ctr">
+                      <a:solidFill>
+                        <a:schemeClr val="tx1"/>
+                      </a:solidFill>
+                    </a:lnR>
+                    <a:lnT w="12699" algn="ctr">
+                      <a:solidFill>
+                        <a:schemeClr val="tx1"/>
+                      </a:solidFill>
+                    </a:lnT>
+                    <a:lnB w="12699" algn="ctr">
+                      <a:solidFill>
+                        <a:schemeClr val="tx1"/>
+                      </a:solidFill>
+                    </a:lnB>
+                    <a:solidFill>
+                      <a:schemeClr val="bg1"/>
+                    </a:solidFill>
+                  </a:tcPr>
+                </a:tc>
+              </a:tr>
+            </a:tbl>
+          </a:graphicData>
+        </a:graphic>
+      </p:graphicFrame>
+      <p:graphicFrame>
+        <p:nvGraphicFramePr>
+          <p:cNvPr id="16" name="" hidden="0"/>
+          <p:cNvGraphicFramePr>
+            <a:graphicFrameLocks xmlns:a="http://schemas.openxmlformats.org/drawingml/2006/main"/>
+          </p:cNvGraphicFramePr>
+          <p:nvPr isPhoto="0" userDrawn="0"/>
+        </p:nvGraphicFramePr>
+        <p:xfrm>
+          <a:off x="9252477" y="4283013"/>
+          <a:ext cx="2426275" cy="2283459"/>
+        </p:xfrm>
+        <a:graphic>
+          <a:graphicData uri="http://schemas.openxmlformats.org/drawingml/2006/table">
+            <a:tbl>
+              <a:tblPr firstRow="1" firstCol="0" lastRow="0" lastCol="0" bandRow="1" bandCol="0">
+                <a:tableStyleId>{B8CBBEDC-A73A-6342-AF84-C5CCFE4BA3C3}</a:tableStyleId>
+              </a:tblPr>
+              <a:tblGrid>
+                <a:gridCol w="2413575"/>
+              </a:tblGrid>
+              <a:tr h="311806">
+                <a:tc>
+                  <a:txBody>
+                    <a:bodyPr/>
+                    <a:p>
+                      <a:pPr algn="ctr">
+                        <a:defRPr/>
+                      </a:pPr>
+                      <a:r>
+                        <a:rPr>
+                          <a:solidFill>
+                            <a:schemeClr val="tx1"/>
+                          </a:solidFill>
+                          <a:latin typeface="CMU Serif"/>
+                          <a:ea typeface="CMU Serif"/>
+                          <a:cs typeface="CMU Serif"/>
+                        </a:rPr>
+                        <a:t>package</a:t>
+                      </a:r>
+                      <a:endParaRPr>
+                        <a:solidFill>
+                          <a:schemeClr val="tx1"/>
+                        </a:solidFill>
+                        <a:latin typeface="CMU Serif"/>
+                        <a:ea typeface="CMU Serif"/>
+                        <a:cs typeface="CMU Serif"/>
+                      </a:endParaRPr>
+                    </a:p>
+                  </a:txBody>
+                  <a:tcPr>
+                    <a:lnL w="12699" algn="ctr">
+                      <a:solidFill>
+                        <a:schemeClr val="tx1"/>
+                      </a:solidFill>
+                    </a:lnL>
+                    <a:lnR w="12699" algn="ctr">
+                      <a:solidFill>
+                        <a:schemeClr val="tx1"/>
+                      </a:solidFill>
+                    </a:lnR>
+                    <a:lnT w="12699" algn="ctr">
+                      <a:solidFill>
+                        <a:schemeClr val="tx1"/>
+                      </a:solidFill>
+                    </a:lnT>
+                    <a:lnB w="12699" algn="ctr">
+                      <a:solidFill>
+                        <a:schemeClr val="tx1"/>
+                      </a:solidFill>
+                    </a:lnB>
+                    <a:solidFill>
+                      <a:schemeClr val="bg1"/>
+                    </a:solidFill>
+                  </a:tcPr>
+                </a:tc>
+              </a:tr>
+              <a:tr h="311806">
+                <a:tc>
+                  <a:txBody>
+                    <a:bodyPr/>
+                    <a:p>
+                      <a:pPr>
+                        <a:defRPr/>
+                      </a:pPr>
+                      <a:r>
+                        <a:rPr>
+                          <a:solidFill>
+                            <a:schemeClr val="tx1"/>
+                          </a:solidFill>
+                          <a:latin typeface="CMU Serif"/>
+                          <a:ea typeface="CMU Serif"/>
+                          <a:cs typeface="CMU Serif"/>
+                        </a:rPr>
+                        <a:t>0xAA</a:t>
+                      </a:r>
+                      <a:endParaRPr>
+                        <a:solidFill>
+                          <a:schemeClr val="tx1"/>
+                        </a:solidFill>
+                        <a:latin typeface="CMU Serif"/>
+                        <a:ea typeface="CMU Serif"/>
+                        <a:cs typeface="CMU Serif"/>
+                      </a:endParaRPr>
+                    </a:p>
+                  </a:txBody>
+                  <a:tcPr>
+                    <a:lnL w="12699" algn="ctr">
+                      <a:solidFill>
+                        <a:schemeClr val="tx1"/>
+                      </a:solidFill>
+                    </a:lnL>
+                    <a:lnR w="12699" algn="ctr">
+                      <a:solidFill>
+                        <a:schemeClr val="tx1"/>
+                      </a:solidFill>
+                    </a:lnR>
+                    <a:lnT w="12699" algn="ctr">
+                      <a:solidFill>
+                        <a:schemeClr val="tx1"/>
+                      </a:solidFill>
+                    </a:lnT>
+                    <a:lnB w="12699" algn="ctr">
+                      <a:solidFill>
+                        <a:schemeClr val="tx1"/>
+                      </a:solidFill>
+                    </a:lnB>
+                    <a:solidFill>
+                      <a:schemeClr val="bg1"/>
+                    </a:solidFill>
+                  </a:tcPr>
+                </a:tc>
+              </a:tr>
+              <a:tr h="311806">
+                <a:tc>
+                  <a:txBody>
+                    <a:bodyPr/>
+                    <a:p>
+                      <a:pPr>
+                        <a:defRPr/>
+                      </a:pPr>
+                      <a:r>
+                        <a:rPr>
+                          <a:solidFill>
+                            <a:schemeClr val="tx1"/>
+                          </a:solidFill>
+                          <a:latin typeface="CMU Serif"/>
+                          <a:ea typeface="CMU Serif"/>
+                          <a:cs typeface="CMU Serif"/>
+                        </a:rPr>
+                        <a:t>0xBB</a:t>
+                      </a:r>
+                      <a:endParaRPr>
+                        <a:solidFill>
+                          <a:schemeClr val="tx1"/>
+                        </a:solidFill>
+                        <a:latin typeface="CMU Serif"/>
+                        <a:ea typeface="CMU Serif"/>
+                        <a:cs typeface="CMU Serif"/>
+                      </a:endParaRPr>
+                    </a:p>
+                  </a:txBody>
+                  <a:tcPr>
+                    <a:lnL w="12699" algn="ctr">
+                      <a:solidFill>
+                        <a:schemeClr val="tx1"/>
+                      </a:solidFill>
+                    </a:lnL>
+                    <a:lnR w="12699" algn="ctr">
+                      <a:solidFill>
+                        <a:schemeClr val="tx1"/>
+                      </a:solidFill>
+                    </a:lnR>
+                    <a:lnT w="12699" algn="ctr">
+                      <a:solidFill>
+                        <a:schemeClr val="tx1"/>
+                      </a:solidFill>
+                    </a:lnT>
+                    <a:lnB w="12699" algn="ctr">
+                      <a:solidFill>
+                        <a:schemeClr val="tx1"/>
+                      </a:solidFill>
+                    </a:lnB>
+                    <a:solidFill>
+                      <a:schemeClr val="bg1"/>
+                    </a:solidFill>
+                  </a:tcPr>
+                </a:tc>
+              </a:tr>
+              <a:tr h="311806">
+                <a:tc>
+                  <a:txBody>
+                    <a:bodyPr/>
+                    <a:p>
+                      <a:pPr>
+                        <a:defRPr/>
+                      </a:pPr>
+                      <a:r>
+                        <a:rPr>
+                          <a:solidFill>
+                            <a:schemeClr val="tx1"/>
+                          </a:solidFill>
+                          <a:latin typeface="CMU Serif"/>
+                          <a:ea typeface="CMU Serif"/>
+                          <a:cs typeface="CMU Serif"/>
+                        </a:rPr>
+                        <a:t>56</a:t>
+                      </a:r>
+                      <a:endParaRPr>
+                        <a:solidFill>
+                          <a:schemeClr val="tx1"/>
+                        </a:solidFill>
+                        <a:latin typeface="CMU Serif"/>
+                        <a:ea typeface="CMU Serif"/>
+                        <a:cs typeface="CMU Serif"/>
+                      </a:endParaRPr>
+                    </a:p>
+                  </a:txBody>
+                  <a:tcPr>
+                    <a:lnL w="12699" algn="ctr">
+                      <a:solidFill>
+                        <a:schemeClr val="tx1"/>
+                      </a:solidFill>
+                    </a:lnL>
+                    <a:lnR w="12699" algn="ctr">
+                      <a:solidFill>
+                        <a:schemeClr val="tx1"/>
+                      </a:solidFill>
+                    </a:lnR>
+                    <a:lnT w="12699" algn="ctr">
+                      <a:solidFill>
+                        <a:schemeClr val="tx1"/>
+                      </a:solidFill>
+                    </a:lnT>
+                    <a:lnB w="12699" algn="ctr">
+                      <a:solidFill>
+                        <a:schemeClr val="tx1"/>
+                      </a:solidFill>
+                    </a:lnB>
+                    <a:solidFill>
+                      <a:schemeClr val="bg1"/>
+                    </a:solidFill>
+                  </a:tcPr>
+                </a:tc>
+              </a:tr>
+              <a:tr h="311806">
+                <a:tc>
+                  <a:txBody>
+                    <a:bodyPr/>
+                    <a:p>
+                      <a:pPr>
+                        <a:defRPr/>
+                      </a:pPr>
+                      <a:r>
+                        <a:rPr>
+                          <a:solidFill>
+                            <a:schemeClr val="tx1"/>
+                          </a:solidFill>
+                          <a:latin typeface="CMU Serif"/>
+                          <a:ea typeface="CMU Serif"/>
+                          <a:cs typeface="CMU Serif"/>
+                        </a:rPr>
+                        <a:t>6</a:t>
+                      </a:r>
+                      <a:endParaRPr>
+                        <a:solidFill>
+                          <a:schemeClr val="tx1"/>
+                        </a:solidFill>
+                        <a:latin typeface="CMU Serif"/>
+                        <a:ea typeface="CMU Serif"/>
+                        <a:cs typeface="CMU Serif"/>
+                      </a:endParaRPr>
+                    </a:p>
+                  </a:txBody>
+                  <a:tcPr>
+                    <a:lnL w="12699" algn="ctr">
+                      <a:solidFill>
+                        <a:schemeClr val="tx1"/>
+                      </a:solidFill>
+                    </a:lnL>
+                    <a:lnR w="12699" algn="ctr">
+                      <a:solidFill>
+                        <a:schemeClr val="tx1"/>
+                      </a:solidFill>
+                    </a:lnR>
+                    <a:lnT w="12699" algn="ctr">
+                      <a:solidFill>
+                        <a:schemeClr val="tx1"/>
+                      </a:solidFill>
+                    </a:lnT>
+                    <a:lnB w="12699" algn="ctr">
+                      <a:solidFill>
+                        <a:schemeClr val="tx1"/>
+                      </a:solidFill>
+                    </a:lnB>
+                    <a:solidFill>
+                      <a:schemeClr val="bg1"/>
+                    </a:solidFill>
+                  </a:tcPr>
+                </a:tc>
+              </a:tr>
+              <a:tr h="311806">
+                <a:tc>
+                  <a:txBody>
+                    <a:bodyPr/>
+                    <a:p>
+                      <a:pPr>
+                        <a:defRPr/>
+                      </a:pPr>
+                      <a:r>
+                        <a:rPr>
+                          <a:solidFill>
+                            <a:schemeClr val="tx1"/>
+                          </a:solidFill>
+                          <a:latin typeface="CMU Serif"/>
+                          <a:ea typeface="CMU Serif"/>
+                          <a:cs typeface="CMU Serif"/>
+                        </a:rPr>
+                        <a:t>resent </a:t>
+                      </a:r>
+                      <a:r>
+                        <a:rPr lang="en-US" sz="1800" b="0" i="0" u="none" strike="noStrike" cap="none" spc="0">
+                          <a:solidFill>
+                            <a:schemeClr val="tx1"/>
+                          </a:solidFill>
+                          <a:latin typeface="CMU Serif"/>
+                          <a:ea typeface="CMU Serif"/>
+                          <a:cs typeface="CMU Serif"/>
+                        </a:rPr>
+                        <a:t>(unencrpt.)</a:t>
+                      </a:r>
+                      <a:endParaRPr>
+                        <a:solidFill>
+                          <a:schemeClr val="tx1"/>
+                        </a:solidFill>
+                        <a:latin typeface="CMU Serif"/>
+                        <a:ea typeface="CMU Serif"/>
+                        <a:cs typeface="CMU Serif"/>
+                      </a:endParaRPr>
+                    </a:p>
+                  </a:txBody>
+                  <a:tcPr>
+                    <a:lnL w="12699" algn="ctr">
+                      <a:solidFill>
+                        <a:schemeClr val="tx1"/>
+                      </a:solidFill>
+                    </a:lnL>
+                    <a:lnR w="12699" algn="ctr">
+                      <a:solidFill>
+                        <a:schemeClr val="tx1"/>
+                      </a:solidFill>
+                    </a:lnR>
+                    <a:lnT w="12699" algn="ctr">
+                      <a:solidFill>
+                        <a:schemeClr val="tx1"/>
+                      </a:solidFill>
+                    </a:lnT>
+                    <a:lnB w="12699" algn="ctr">
+                      <a:solidFill>
+                        <a:schemeClr val="tx1"/>
+                      </a:solidFill>
+                    </a:lnB>
+                    <a:solidFill>
+                      <a:schemeClr val="bg1"/>
+                    </a:solidFill>
+                  </a:tcPr>
+                </a:tc>
+              </a:tr>
+            </a:tbl>
+          </a:graphicData>
+        </a:graphic>
+      </p:graphicFrame>
+      <p:cxnSp>
+        <p:nvCxnSpPr>
+          <p:cNvPr id="17" name="" hidden="0"/>
+          <p:cNvCxnSpPr>
+            <a:cxnSpLocks/>
+          </p:cNvCxnSpPr>
+          <p:nvPr isPhoto="0" userDrawn="0"/>
+        </p:nvCxnSpPr>
+        <p:spPr bwMode="auto">
+          <a:xfrm rot="10799990" flipH="0" flipV="0">
+            <a:off x="6990187" y="1774031"/>
+            <a:ext cx="2262289" cy="3650712"/>
+          </a:xfrm>
+          <a:prstGeom prst="bentConnector3">
+            <a:avLst>
+              <a:gd name="adj1" fmla="val 55019"/>
+            </a:avLst>
+          </a:prstGeom>
+          <a:ln w="19049" cap="flat" cmpd="sng" algn="ctr">
+            <a:solidFill>
+              <a:srgbClr val="FF0000"/>
+            </a:solidFill>
+            <a:prstDash val="lgDashDot"/>
+            <a:miter/>
+            <a:tailEnd type="arrow" len="med"/>
+          </a:ln>
+        </p:spPr>
+        <p:style>
+          <a:lnRef idx="1">
+            <a:schemeClr val="accent1">
+              <a:shade val="50000"/>
+            </a:schemeClr>
+          </a:lnRef>
+          <a:fillRef idx="0">
+            <a:schemeClr val="accent1"/>
+          </a:fillRef>
+          <a:effectRef idx="0">
+            <a:schemeClr val="accent1"/>
+          </a:effectRef>
+          <a:fontRef idx="minor">
+            <a:schemeClr val="tx1"/>
+          </a:fontRef>
+        </p:style>
+      </p:cxnSp>
+      <p:cxnSp>
+        <p:nvCxnSpPr>
+          <p:cNvPr id="18" name="" hidden="0"/>
+          <p:cNvCxnSpPr>
+            <a:cxnSpLocks/>
+            <a:stCxn id="15" idx="1"/>
+          </p:cNvCxnSpPr>
+          <p:nvPr isPhoto="0" userDrawn="0"/>
+        </p:nvCxnSpPr>
+        <p:spPr bwMode="auto">
+          <a:xfrm rot="10799990" flipH="0" flipV="0">
+            <a:off x="6980087" y="1648142"/>
+            <a:ext cx="2272390" cy="1288191"/>
+          </a:xfrm>
+          <a:prstGeom prst="bentConnector3">
+            <a:avLst>
+              <a:gd name="adj1" fmla="val 50000"/>
+            </a:avLst>
+          </a:prstGeom>
+          <a:ln w="19049" cap="flat" cmpd="sng" algn="ctr">
+            <a:solidFill>
+              <a:srgbClr val="0070C0"/>
+            </a:solidFill>
+            <a:prstDash val="lgDashDot"/>
+            <a:miter/>
+            <a:tailEnd type="arrow" len="med"/>
+          </a:ln>
+        </p:spPr>
+        <p:style>
+          <a:lnRef idx="1">
+            <a:schemeClr val="accent1">
+              <a:shade val="50000"/>
+            </a:schemeClr>
+          </a:lnRef>
+          <a:fillRef idx="0">
+            <a:schemeClr val="accent1"/>
+          </a:fillRef>
+          <a:effectRef idx="0">
+            <a:schemeClr val="accent1"/>
+          </a:effectRef>
+          <a:fontRef idx="minor">
+            <a:schemeClr val="tx1"/>
+          </a:fontRef>
+        </p:style>
+      </p:cxnSp>
+      <p:cxnSp>
+        <p:nvCxnSpPr>
+          <p:cNvPr id="19" name="" hidden="0"/>
+          <p:cNvCxnSpPr>
+            <a:cxnSpLocks/>
+            <a:stCxn id="6" idx="0"/>
+          </p:cNvCxnSpPr>
+          <p:nvPr isPhoto="0" userDrawn="0"/>
+        </p:nvCxnSpPr>
+        <p:spPr bwMode="auto">
+          <a:xfrm rot="16199969" flipH="0" flipV="1">
+            <a:off x="5680540" y="918396"/>
+            <a:ext cx="431855" cy="0"/>
+          </a:xfrm>
+          <a:prstGeom prst="line">
+            <a:avLst/>
+          </a:prstGeom>
+          <a:ln w="19049" cap="flat" cmpd="sng" algn="ctr">
+            <a:solidFill>
+              <a:srgbClr val="000000"/>
+            </a:solidFill>
+            <a:prstDash val="lgDashDot"/>
+            <a:miter/>
+            <a:tailEnd type="arrow" len="med"/>
+          </a:ln>
+        </p:spPr>
+        <p:style>
+          <a:lnRef idx="1">
+            <a:schemeClr val="accent1">
+              <a:shade val="50000"/>
+            </a:schemeClr>
+          </a:lnRef>
+          <a:fillRef idx="0">
+            <a:schemeClr val="accent1"/>
+          </a:fillRef>
+          <a:effectRef idx="0">
+            <a:schemeClr val="accent1"/>
+          </a:effectRef>
+          <a:fontRef idx="minor">
+            <a:schemeClr val="tx1"/>
+          </a:fontRef>
+        </p:style>
+      </p:cxnSp>
+      <p:sp>
+        <p:nvSpPr>
+          <p:cNvPr id="20" name="" hidden="0"/>
+          <p:cNvSpPr/>
+          <p:nvPr isPhoto="0" userDrawn="0"/>
+        </p:nvSpPr>
+        <p:spPr bwMode="auto">
+          <a:xfrm flipH="0" flipV="0">
+            <a:off x="571523" y="114757"/>
+            <a:ext cx="2214561" cy="365794"/>
+          </a:xfrm>
+          <a:prstGeom prst="rect">
+            <a:avLst/>
+          </a:prstGeom>
+          <a:noFill/>
+        </p:spPr>
+        <p:txBody>
+          <a:bodyPr vertOverflow="overflow" horzOverflow="clip" vert="horz" wrap="square" lIns="91440" tIns="45720" rIns="91440" bIns="45720" numCol="1" spcCol="0" rtlCol="0" fromWordArt="0" anchor="t" anchorCtr="0" forceAA="0" upright="0" compatLnSpc="0">
+            <a:noAutofit/>
+          </a:bodyPr>
+          <a:p>
+            <a:pPr algn="ctr">
+              <a:defRPr/>
+            </a:pPr>
+            <a:r>
+              <a:rPr>
+                <a:latin typeface="CMU Serif"/>
+                <a:ea typeface="CMU Serif"/>
+                <a:cs typeface="CMU Serif"/>
+              </a:rPr>
+              <a:t>Sender </a:t>
+            </a:r>
+            <a:endParaRPr>
+              <a:latin typeface="CMU Serif"/>
+              <a:ea typeface="CMU Serif"/>
+              <a:cs typeface="CMU Serif"/>
+            </a:endParaRPr>
+          </a:p>
+        </p:txBody>
+      </p:sp>
+      <p:sp>
+        <p:nvSpPr>
+          <p:cNvPr id="21" name="" hidden="0"/>
+          <p:cNvSpPr/>
+          <p:nvPr isPhoto="0" userDrawn="0"/>
+        </p:nvSpPr>
+        <p:spPr bwMode="auto">
+          <a:xfrm flipH="0" flipV="0">
+            <a:off x="9358335" y="114757"/>
+            <a:ext cx="2214560" cy="365793"/>
+          </a:xfrm>
+          <a:prstGeom prst="rect">
+            <a:avLst/>
+          </a:prstGeom>
+          <a:noFill/>
+        </p:spPr>
+        <p:txBody>
+          <a:bodyPr vertOverflow="overflow" horzOverflow="clip" vert="horz" wrap="square" lIns="91440" tIns="45720" rIns="91440" bIns="45720" numCol="1" spcCol="0" rtlCol="0" fromWordArt="0" anchor="t" anchorCtr="0" forceAA="0" upright="0" compatLnSpc="0">
+            <a:noAutofit/>
+          </a:bodyPr>
+          <a:p>
+            <a:pPr algn="ctr">
+              <a:defRPr/>
+            </a:pPr>
+            <a:r>
+              <a:rPr>
+                <a:latin typeface="CMU Serif"/>
+                <a:ea typeface="CMU Serif"/>
+                <a:cs typeface="CMU Serif"/>
+              </a:rPr>
+              <a:t>Receiver</a:t>
+            </a:r>
+            <a:endParaRPr>
+              <a:latin typeface="CMU Serif"/>
+              <a:ea typeface="CMU Serif"/>
+              <a:cs typeface="CMU Serif"/>
+            </a:endParaRPr>
+          </a:p>
+        </p:txBody>
+      </p:sp>
+      <p:cxnSp>
+        <p:nvCxnSpPr>
+          <p:cNvPr id="22" name="" hidden="0"/>
+          <p:cNvCxnSpPr>
+            <a:cxnSpLocks/>
+            <a:stCxn id="6" idx="2"/>
+            <a:endCxn id="8" idx="3"/>
+          </p:cNvCxnSpPr>
+          <p:nvPr isPhoto="0" userDrawn="0"/>
+        </p:nvCxnSpPr>
+        <p:spPr bwMode="auto">
+          <a:xfrm rot="5399978" flipH="0" flipV="0">
+            <a:off x="4531285" y="3376481"/>
+            <a:ext cx="2462297" cy="271380"/>
+          </a:xfrm>
+          <a:prstGeom prst="bentConnector2">
+            <a:avLst/>
+          </a:prstGeom>
+          <a:ln w="19049" cap="flat" cmpd="sng" algn="ctr">
+            <a:solidFill>
+              <a:srgbClr val="0070C0"/>
+            </a:solidFill>
+            <a:prstDash val="lgDashDot"/>
+            <a:miter/>
+            <a:tailEnd type="arrow" len="med"/>
+          </a:ln>
+        </p:spPr>
+        <p:style>
+          <a:lnRef idx="1">
+            <a:schemeClr val="accent1">
+              <a:shade val="50000"/>
+            </a:schemeClr>
+          </a:lnRef>
+          <a:fillRef idx="0">
+            <a:schemeClr val="accent1"/>
+          </a:fillRef>
+          <a:effectRef idx="0">
+            <a:schemeClr val="accent1"/>
+          </a:effectRef>
+          <a:fontRef idx="minor">
+            <a:schemeClr val="tx1"/>
+          </a:fontRef>
+        </p:style>
+      </p:cxnSp>
+      <p:cxnSp>
+        <p:nvCxnSpPr>
+          <p:cNvPr id="23" name="" hidden="0"/>
+          <p:cNvCxnSpPr>
+            <a:cxnSpLocks/>
+            <a:endCxn id="11" idx="3"/>
+          </p:cNvCxnSpPr>
+          <p:nvPr isPhoto="0" userDrawn="0"/>
+        </p:nvCxnSpPr>
+        <p:spPr bwMode="auto">
+          <a:xfrm rot="5399978" flipH="0" flipV="0">
+            <a:off x="3974673" y="3933091"/>
+            <a:ext cx="3694581" cy="390442"/>
+          </a:xfrm>
+          <a:prstGeom prst="bentConnector2">
+            <a:avLst/>
+          </a:prstGeom>
+          <a:ln w="19049" cap="flat" cmpd="sng" algn="ctr">
+            <a:solidFill>
+              <a:srgbClr val="FF0000"/>
+            </a:solidFill>
+            <a:prstDash val="lgDashDot"/>
+            <a:miter/>
+            <a:tailEnd type="arrow" len="med"/>
+          </a:ln>
+        </p:spPr>
+        <p:style>
+          <a:lnRef idx="1">
+            <a:schemeClr val="accent1">
+              <a:shade val="50000"/>
+            </a:schemeClr>
+          </a:lnRef>
+          <a:fillRef idx="0">
+            <a:schemeClr val="accent1"/>
+          </a:fillRef>
+          <a:effectRef idx="0">
+            <a:schemeClr val="accent1"/>
+          </a:effectRef>
+          <a:fontRef idx="minor">
+            <a:schemeClr val="tx1"/>
+          </a:fontRef>
+        </p:style>
+      </p:cxnSp>
+      <p:sp>
+        <p:nvSpPr>
+          <p:cNvPr id="24" name="" hidden="0"/>
+          <p:cNvSpPr/>
+          <p:nvPr isPhoto="0" userDrawn="0"/>
+        </p:nvSpPr>
+        <p:spPr bwMode="auto">
+          <a:xfrm flipH="0" flipV="0">
+            <a:off x="5256842" y="200150"/>
+            <a:ext cx="1282563" cy="365792"/>
+          </a:xfrm>
+          <a:prstGeom prst="rect">
+            <a:avLst/>
+          </a:prstGeom>
+          <a:noFill/>
+        </p:spPr>
+        <p:txBody>
+          <a:bodyPr vertOverflow="overflow" horzOverflow="clip" vert="horz" wrap="square" lIns="91440" tIns="45720" rIns="91440" bIns="45720" numCol="1" spcCol="0" rtlCol="0" fromWordArt="0" anchor="t" anchorCtr="0" forceAA="0" upright="0" compatLnSpc="0">
+            <a:noAutofit/>
+          </a:bodyPr>
+          <a:p>
+            <a:pPr algn="ctr">
+              <a:defRPr/>
+            </a:pPr>
+            <a:r>
+              <a:rPr>
+                <a:latin typeface="CMU Serif"/>
+                <a:ea typeface="CMU Serif"/>
+                <a:cs typeface="CMU Serif"/>
+              </a:rPr>
+              <a:t>LoRa</a:t>
+            </a:r>
+            <a:endParaRPr>
+              <a:latin typeface="CMU Serif"/>
+              <a:ea typeface="CMU Serif"/>
+              <a:cs typeface="CMU Serif"/>
+            </a:endParaRPr>
+          </a:p>
+        </p:txBody>
+      </p:sp>
     </p:spTree>
   </p:cSld>
   <p:clrMapOvr>

</xml_diff>